<commit_message>
use case added in ppt
</commit_message>
<xml_diff>
--- a/Presentation/Project_Presentation.pptx
+++ b/Presentation/Project_Presentation.pptx
@@ -16,6 +16,9 @@
     <p:sldId id="264" r:id="rId10"/>
     <p:sldId id="265" r:id="rId11"/>
     <p:sldId id="266" r:id="rId12"/>
+    <p:sldId id="267" r:id="rId13"/>
+    <p:sldId id="268" r:id="rId14"/>
+    <p:sldId id="269" r:id="rId15"/>
   </p:sldIdLst>
   <p:sldSz cx="9144000" cy="6858000" type="screen4x3"/>
   <p:notesSz cx="6858000" cy="9144000"/>
@@ -298,6 +301,7 @@
           <a:p>
             <a:fld id="{22278AEF-C5F7-4B66-AA02-1B9777B8FF83}" type="datetimeFigureOut">
               <a:rPr lang="en-US" smtClean="0"/>
+              <a:pPr/>
               <a:t>03-Oct-20</a:t>
             </a:fld>
             <a:endParaRPr lang="en-US"/>
@@ -340,6 +344,7 @@
           <a:p>
             <a:fld id="{FAF84F99-15C9-424C-8C40-4FD4E37FE306}" type="slidenum">
               <a:rPr lang="en-US" smtClean="0"/>
+              <a:pPr/>
               <a:t>‹#›</a:t>
             </a:fld>
             <a:endParaRPr lang="en-US"/>
@@ -463,6 +468,7 @@
           <a:p>
             <a:fld id="{22278AEF-C5F7-4B66-AA02-1B9777B8FF83}" type="datetimeFigureOut">
               <a:rPr lang="en-US" smtClean="0"/>
+              <a:pPr/>
               <a:t>03-Oct-20</a:t>
             </a:fld>
             <a:endParaRPr lang="en-US"/>
@@ -505,6 +511,7 @@
           <a:p>
             <a:fld id="{FAF84F99-15C9-424C-8C40-4FD4E37FE306}" type="slidenum">
               <a:rPr lang="en-US" smtClean="0"/>
+              <a:pPr/>
               <a:t>‹#›</a:t>
             </a:fld>
             <a:endParaRPr lang="en-US"/>
@@ -638,6 +645,7 @@
           <a:p>
             <a:fld id="{22278AEF-C5F7-4B66-AA02-1B9777B8FF83}" type="datetimeFigureOut">
               <a:rPr lang="en-US" smtClean="0"/>
+              <a:pPr/>
               <a:t>03-Oct-20</a:t>
             </a:fld>
             <a:endParaRPr lang="en-US"/>
@@ -680,6 +688,7 @@
           <a:p>
             <a:fld id="{FAF84F99-15C9-424C-8C40-4FD4E37FE306}" type="slidenum">
               <a:rPr lang="en-US" smtClean="0"/>
+              <a:pPr/>
               <a:t>‹#›</a:t>
             </a:fld>
             <a:endParaRPr lang="en-US"/>
@@ -803,6 +812,7 @@
           <a:p>
             <a:fld id="{22278AEF-C5F7-4B66-AA02-1B9777B8FF83}" type="datetimeFigureOut">
               <a:rPr lang="en-US" smtClean="0"/>
+              <a:pPr/>
               <a:t>03-Oct-20</a:t>
             </a:fld>
             <a:endParaRPr lang="en-US"/>
@@ -845,6 +855,7 @@
           <a:p>
             <a:fld id="{FAF84F99-15C9-424C-8C40-4FD4E37FE306}" type="slidenum">
               <a:rPr lang="en-US" smtClean="0"/>
+              <a:pPr/>
               <a:t>‹#›</a:t>
             </a:fld>
             <a:endParaRPr lang="en-US"/>
@@ -1044,6 +1055,7 @@
           <a:p>
             <a:fld id="{22278AEF-C5F7-4B66-AA02-1B9777B8FF83}" type="datetimeFigureOut">
               <a:rPr lang="en-US" smtClean="0"/>
+              <a:pPr/>
               <a:t>03-Oct-20</a:t>
             </a:fld>
             <a:endParaRPr lang="en-US"/>
@@ -1086,6 +1098,7 @@
           <a:p>
             <a:fld id="{FAF84F99-15C9-424C-8C40-4FD4E37FE306}" type="slidenum">
               <a:rPr lang="en-US" smtClean="0"/>
+              <a:pPr/>
               <a:t>‹#›</a:t>
             </a:fld>
             <a:endParaRPr lang="en-US"/>
@@ -1327,6 +1340,7 @@
           <a:p>
             <a:fld id="{22278AEF-C5F7-4B66-AA02-1B9777B8FF83}" type="datetimeFigureOut">
               <a:rPr lang="en-US" smtClean="0"/>
+              <a:pPr/>
               <a:t>03-Oct-20</a:t>
             </a:fld>
             <a:endParaRPr lang="en-US"/>
@@ -1369,6 +1383,7 @@
           <a:p>
             <a:fld id="{FAF84F99-15C9-424C-8C40-4FD4E37FE306}" type="slidenum">
               <a:rPr lang="en-US" smtClean="0"/>
+              <a:pPr/>
               <a:t>‹#›</a:t>
             </a:fld>
             <a:endParaRPr lang="en-US"/>
@@ -1744,6 +1759,7 @@
           <a:p>
             <a:fld id="{22278AEF-C5F7-4B66-AA02-1B9777B8FF83}" type="datetimeFigureOut">
               <a:rPr lang="en-US" smtClean="0"/>
+              <a:pPr/>
               <a:t>03-Oct-20</a:t>
             </a:fld>
             <a:endParaRPr lang="en-US"/>
@@ -1786,6 +1802,7 @@
           <a:p>
             <a:fld id="{FAF84F99-15C9-424C-8C40-4FD4E37FE306}" type="slidenum">
               <a:rPr lang="en-US" smtClean="0"/>
+              <a:pPr/>
               <a:t>‹#›</a:t>
             </a:fld>
             <a:endParaRPr lang="en-US"/>
@@ -1857,6 +1874,7 @@
           <a:p>
             <a:fld id="{22278AEF-C5F7-4B66-AA02-1B9777B8FF83}" type="datetimeFigureOut">
               <a:rPr lang="en-US" smtClean="0"/>
+              <a:pPr/>
               <a:t>03-Oct-20</a:t>
             </a:fld>
             <a:endParaRPr lang="en-US"/>
@@ -1899,6 +1917,7 @@
           <a:p>
             <a:fld id="{FAF84F99-15C9-424C-8C40-4FD4E37FE306}" type="slidenum">
               <a:rPr lang="en-US" smtClean="0"/>
+              <a:pPr/>
               <a:t>‹#›</a:t>
             </a:fld>
             <a:endParaRPr lang="en-US"/>
@@ -1947,6 +1966,7 @@
           <a:p>
             <a:fld id="{22278AEF-C5F7-4B66-AA02-1B9777B8FF83}" type="datetimeFigureOut">
               <a:rPr lang="en-US" smtClean="0"/>
+              <a:pPr/>
               <a:t>03-Oct-20</a:t>
             </a:fld>
             <a:endParaRPr lang="en-US"/>
@@ -1989,6 +2009,7 @@
           <a:p>
             <a:fld id="{FAF84F99-15C9-424C-8C40-4FD4E37FE306}" type="slidenum">
               <a:rPr lang="en-US" smtClean="0"/>
+              <a:pPr/>
               <a:t>‹#›</a:t>
             </a:fld>
             <a:endParaRPr lang="en-US"/>
@@ -2219,6 +2240,7 @@
           <a:p>
             <a:fld id="{22278AEF-C5F7-4B66-AA02-1B9777B8FF83}" type="datetimeFigureOut">
               <a:rPr lang="en-US" smtClean="0"/>
+              <a:pPr/>
               <a:t>03-Oct-20</a:t>
             </a:fld>
             <a:endParaRPr lang="en-US"/>
@@ -2261,6 +2283,7 @@
           <a:p>
             <a:fld id="{FAF84F99-15C9-424C-8C40-4FD4E37FE306}" type="slidenum">
               <a:rPr lang="en-US" smtClean="0"/>
+              <a:pPr/>
               <a:t>‹#›</a:t>
             </a:fld>
             <a:endParaRPr lang="en-US"/>
@@ -2467,6 +2490,7 @@
           <a:p>
             <a:fld id="{22278AEF-C5F7-4B66-AA02-1B9777B8FF83}" type="datetimeFigureOut">
               <a:rPr lang="en-US" smtClean="0"/>
+              <a:pPr/>
               <a:t>03-Oct-20</a:t>
             </a:fld>
             <a:endParaRPr lang="en-US"/>
@@ -2509,6 +2533,7 @@
           <a:p>
             <a:fld id="{FAF84F99-15C9-424C-8C40-4FD4E37FE306}" type="slidenum">
               <a:rPr lang="en-US" smtClean="0"/>
+              <a:pPr/>
               <a:t>‹#›</a:t>
             </a:fld>
             <a:endParaRPr lang="en-US"/>
@@ -2675,6 +2700,7 @@
           <a:p>
             <a:fld id="{22278AEF-C5F7-4B66-AA02-1B9777B8FF83}" type="datetimeFigureOut">
               <a:rPr lang="en-US" smtClean="0"/>
+              <a:pPr/>
               <a:t>03-Oct-20</a:t>
             </a:fld>
             <a:endParaRPr lang="en-US"/>
@@ -2753,6 +2779,7 @@
           <a:p>
             <a:fld id="{FAF84F99-15C9-424C-8C40-4FD4E37FE306}" type="slidenum">
               <a:rPr lang="en-US" smtClean="0"/>
+              <a:pPr/>
               <a:t>‹#›</a:t>
             </a:fld>
             <a:endParaRPr lang="en-US"/>
@@ -3139,19 +3166,7 @@
           <a:p>
             <a:r>
               <a:rPr lang="en-US" dirty="0" smtClean="0"/>
-              <a:t>Our app </a:t>
-            </a:r>
-            <a:r>
-              <a:rPr lang="en-US" dirty="0" smtClean="0"/>
-              <a:t>will be supportable in </a:t>
-            </a:r>
-            <a:r>
-              <a:rPr lang="en-US" dirty="0" smtClean="0"/>
-              <a:t>every android </a:t>
-            </a:r>
-            <a:r>
-              <a:rPr lang="en-US" dirty="0" smtClean="0"/>
-              <a:t>mobiles.</a:t>
+              <a:t>Our app will be supportable in every android mobiles.</a:t>
             </a:r>
           </a:p>
           <a:p>
@@ -3413,6 +3428,169 @@
           </a:p>
         </p:txBody>
       </p:sp>
+    </p:spTree>
+  </p:cSld>
+  <p:clrMapOvr>
+    <a:masterClrMapping/>
+  </p:clrMapOvr>
+</p:sld>
+</file>
+
+<file path=ppt/slides/slide12.xml><?xml version="1.0" encoding="utf-8"?>
+<p:sld xmlns:a="http://schemas.openxmlformats.org/drawingml/2006/main" xmlns:r="http://schemas.openxmlformats.org/officeDocument/2006/relationships" xmlns:p="http://schemas.openxmlformats.org/presentationml/2006/main">
+  <p:cSld>
+    <p:spTree>
+      <p:nvGrpSpPr>
+        <p:cNvPr id="1" name=""/>
+        <p:cNvGrpSpPr/>
+        <p:nvPr/>
+      </p:nvGrpSpPr>
+      <p:grpSpPr>
+        <a:xfrm>
+          <a:off x="0" y="0"/>
+          <a:ext cx="0" cy="0"/>
+          <a:chOff x="0" y="0"/>
+          <a:chExt cx="0" cy="0"/>
+        </a:xfrm>
+      </p:grpSpPr>
+      <p:pic>
+        <p:nvPicPr>
+          <p:cNvPr id="1026" name="Picture 2"/>
+          <p:cNvPicPr>
+            <a:picLocks noGrp="1" noChangeAspect="1" noChangeArrowheads="1"/>
+          </p:cNvPicPr>
+          <p:nvPr>
+            <p:ph idx="1"/>
+          </p:nvPr>
+        </p:nvPicPr>
+        <p:blipFill>
+          <a:blip r:embed="rId2" cstate="print"/>
+          <a:srcRect/>
+          <a:stretch>
+            <a:fillRect/>
+          </a:stretch>
+        </p:blipFill>
+        <p:spPr bwMode="auto">
+          <a:xfrm>
+            <a:off x="0" y="76200"/>
+            <a:ext cx="9144000" cy="6858000"/>
+          </a:xfrm>
+          <a:prstGeom prst="rect">
+            <a:avLst/>
+          </a:prstGeom>
+          <a:noFill/>
+          <a:ln w="9525">
+            <a:noFill/>
+            <a:miter lim="800000"/>
+            <a:headEnd/>
+            <a:tailEnd/>
+          </a:ln>
+          <a:effectLst/>
+        </p:spPr>
+      </p:pic>
+    </p:spTree>
+  </p:cSld>
+  <p:clrMapOvr>
+    <a:masterClrMapping/>
+  </p:clrMapOvr>
+</p:sld>
+</file>
+
+<file path=ppt/slides/slide13.xml><?xml version="1.0" encoding="utf-8"?>
+<p:sld xmlns:a="http://schemas.openxmlformats.org/drawingml/2006/main" xmlns:r="http://schemas.openxmlformats.org/officeDocument/2006/relationships" xmlns:p="http://schemas.openxmlformats.org/presentationml/2006/main">
+  <p:cSld>
+    <p:spTree>
+      <p:nvGrpSpPr>
+        <p:cNvPr id="1" name=""/>
+        <p:cNvGrpSpPr/>
+        <p:nvPr/>
+      </p:nvGrpSpPr>
+      <p:grpSpPr>
+        <a:xfrm>
+          <a:off x="0" y="0"/>
+          <a:ext cx="0" cy="0"/>
+          <a:chOff x="0" y="0"/>
+          <a:chExt cx="0" cy="0"/>
+        </a:xfrm>
+      </p:grpSpPr>
+      <p:graphicFrame>
+        <p:nvGraphicFramePr>
+          <p:cNvPr id="2050" name="Object 2"/>
+          <p:cNvGraphicFramePr>
+            <a:graphicFrameLocks noChangeAspect="1"/>
+          </p:cNvGraphicFramePr>
+          <p:nvPr/>
+        </p:nvGraphicFramePr>
+        <p:xfrm>
+          <a:off x="-370194" y="228601"/>
+          <a:ext cx="8752194" cy="6476999"/>
+        </p:xfrm>
+        <a:graphic>
+          <a:graphicData uri="http://schemas.openxmlformats.org/presentationml/2006/ole">
+            <p:oleObj spid="_x0000_s2050" name="Visio" r:id="rId3" imgW="6486663" imgH="7257885" progId="Visio.Drawing.15">
+              <p:embed/>
+            </p:oleObj>
+          </a:graphicData>
+        </a:graphic>
+      </p:graphicFrame>
+    </p:spTree>
+  </p:cSld>
+  <p:clrMapOvr>
+    <a:masterClrMapping/>
+  </p:clrMapOvr>
+</p:sld>
+</file>
+
+<file path=ppt/slides/slide14.xml><?xml version="1.0" encoding="utf-8"?>
+<p:sld xmlns:a="http://schemas.openxmlformats.org/drawingml/2006/main" xmlns:r="http://schemas.openxmlformats.org/officeDocument/2006/relationships" xmlns:p="http://schemas.openxmlformats.org/presentationml/2006/main">
+  <p:cSld>
+    <p:spTree>
+      <p:nvGrpSpPr>
+        <p:cNvPr id="1" name=""/>
+        <p:cNvGrpSpPr/>
+        <p:nvPr/>
+      </p:nvGrpSpPr>
+      <p:grpSpPr>
+        <a:xfrm>
+          <a:off x="0" y="0"/>
+          <a:ext cx="0" cy="0"/>
+          <a:chOff x="0" y="0"/>
+          <a:chExt cx="0" cy="0"/>
+        </a:xfrm>
+      </p:grpSpPr>
+      <p:pic>
+        <p:nvPicPr>
+          <p:cNvPr id="3074" name="Picture 2"/>
+          <p:cNvPicPr>
+            <a:picLocks noChangeAspect="1" noChangeArrowheads="1"/>
+          </p:cNvPicPr>
+          <p:nvPr/>
+        </p:nvPicPr>
+        <p:blipFill>
+          <a:blip r:embed="rId2"/>
+          <a:srcRect/>
+          <a:stretch>
+            <a:fillRect/>
+          </a:stretch>
+        </p:blipFill>
+        <p:spPr bwMode="auto">
+          <a:xfrm>
+            <a:off x="0" y="152400"/>
+            <a:ext cx="9143999" cy="6705600"/>
+          </a:xfrm>
+          <a:prstGeom prst="rect">
+            <a:avLst/>
+          </a:prstGeom>
+          <a:noFill/>
+          <a:ln w="9525">
+            <a:noFill/>
+            <a:miter lim="800000"/>
+            <a:headEnd/>
+            <a:tailEnd/>
+          </a:ln>
+          <a:effectLst/>
+        </p:spPr>
+      </p:pic>
     </p:spTree>
   </p:cSld>
   <p:clrMapOvr>

</xml_diff>

<commit_message>
font of ppt is updated
</commit_message>
<xml_diff>
--- a/Presentation/Project_Presentation.pptx
+++ b/Presentation/Project_Presentation.pptx
@@ -148,7 +148,7 @@
   </p:defaultTextStyle>
   <p:extLst>
     <p:ext uri="{EFAFB233-063F-42B5-8137-9DF3F51BA10A}">
-      <p15:sldGuideLst xmlns:p15="http://schemas.microsoft.com/office/powerpoint/2012/main">
+      <p15:sldGuideLst xmlns:p15="http://schemas.microsoft.com/office/powerpoint/2012/main" xmlns="">
         <p15:guide id="1" orient="horz" pos="2160">
           <p15:clr>
             <a:srgbClr val="A4A3A4"/>
@@ -6147,12 +6147,66 @@
             <p:ph type="subTitle" idx="1"/>
           </p:nvPr>
         </p:nvSpPr>
-        <p:spPr/>
-        <p:txBody>
-          <a:bodyPr/>
+        <p:spPr>
+          <a:xfrm>
+            <a:off x="1848699" y="3962400"/>
+            <a:ext cx="5826719" cy="2045166"/>
+          </a:xfrm>
+        </p:spPr>
+        <p:txBody>
+          <a:bodyPr>
+            <a:normAutofit/>
+          </a:bodyPr>
           <a:lstStyle/>
           <a:p>
-            <a:endParaRPr lang="en-US"/>
+            <a:pPr algn="l"/>
+            <a:r>
+              <a:rPr lang="en-US" dirty="0" smtClean="0"/>
+              <a:t>		Team Members :</a:t>
+            </a:r>
+          </a:p>
+          <a:p>
+            <a:pPr marL="342900" indent="-342900" algn="l">
+              <a:buFont typeface="+mj-lt"/>
+              <a:buAutoNum type="arabicPeriod"/>
+            </a:pPr>
+            <a:r>
+              <a:rPr lang="en-US" dirty="0" err="1" smtClean="0"/>
+              <a:t>Avani</a:t>
+            </a:r>
+            <a:r>
+              <a:rPr lang="en-US" dirty="0" smtClean="0"/>
+              <a:t> Sanghvi-170410107099</a:t>
+            </a:r>
+          </a:p>
+          <a:p>
+            <a:pPr marL="342900" indent="-342900" algn="l">
+              <a:buFont typeface="+mj-lt"/>
+              <a:buAutoNum type="arabicPeriod"/>
+            </a:pPr>
+            <a:r>
+              <a:rPr lang="en-US" dirty="0" err="1" smtClean="0"/>
+              <a:t>Sarvesh</a:t>
+            </a:r>
+            <a:r>
+              <a:rPr lang="en-US" dirty="0" smtClean="0"/>
+              <a:t> Purohit-170410107091</a:t>
+            </a:r>
+          </a:p>
+          <a:p>
+            <a:pPr marL="342900" indent="-342900" algn="l">
+              <a:buFont typeface="+mj-lt"/>
+              <a:buAutoNum type="arabicPeriod"/>
+            </a:pPr>
+            <a:r>
+              <a:rPr lang="en-US" dirty="0" err="1" smtClean="0"/>
+              <a:t>Dhruv</a:t>
+            </a:r>
+            <a:r>
+              <a:rPr lang="en-US" dirty="0" smtClean="0"/>
+              <a:t> Bhavsar-170410107006 </a:t>
+            </a:r>
+            <a:endParaRPr lang="en-US" dirty="0"/>
           </a:p>
         </p:txBody>
       </p:sp>
@@ -6161,7 +6215,7 @@
           <p:cNvPr id="3074" name="Picture 2" descr="Image result for sVIT LOGO">
             <a:extLst>
               <a:ext uri="{FF2B5EF4-FFF2-40B4-BE49-F238E27FC236}">
-                <a16:creationId xmlns:a16="http://schemas.microsoft.com/office/drawing/2014/main" id="{0300D63E-15ED-4836-9BDD-251EFB29B321}"/>
+                <a16:creationId xmlns:a16="http://schemas.microsoft.com/office/drawing/2014/main" xmlns="" id="{0300D63E-15ED-4836-9BDD-251EFB29B321}"/>
               </a:ext>
             </a:extLst>
           </p:cNvPr>
@@ -6203,6 +6257,88 @@
           </a:extLst>
         </p:spPr>
       </p:pic>
+      <p:sp>
+        <p:nvSpPr>
+          <p:cNvPr id="2" name="TextBox 1"/>
+          <p:cNvSpPr txBox="1"/>
+          <p:nvPr/>
+        </p:nvSpPr>
+        <p:spPr>
+          <a:xfrm>
+            <a:off x="3657600" y="2130425"/>
+            <a:ext cx="3983182" cy="769441"/>
+          </a:xfrm>
+          <a:prstGeom prst="rect">
+            <a:avLst/>
+          </a:prstGeom>
+          <a:noFill/>
+        </p:spPr>
+        <p:txBody>
+          <a:bodyPr wrap="square" rtlCol="0">
+            <a:spAutoFit/>
+          </a:bodyPr>
+          <a:lstStyle/>
+          <a:p>
+            <a:r>
+              <a:rPr lang="en-US" sz="4400" dirty="0" err="1" smtClean="0">
+                <a:solidFill>
+                  <a:schemeClr val="accent1">
+                    <a:lumMod val="75000"/>
+                  </a:schemeClr>
+                </a:solidFill>
+              </a:rPr>
+              <a:t>Dine@myTime</a:t>
+            </a:r>
+            <a:endParaRPr lang="en-US" sz="4400" dirty="0">
+              <a:solidFill>
+                <a:schemeClr val="accent1">
+                  <a:lumMod val="75000"/>
+                </a:schemeClr>
+              </a:solidFill>
+            </a:endParaRPr>
+          </a:p>
+        </p:txBody>
+      </p:sp>
+      <p:sp>
+        <p:nvSpPr>
+          <p:cNvPr id="4" name="TextBox 3"/>
+          <p:cNvSpPr txBox="1"/>
+          <p:nvPr/>
+        </p:nvSpPr>
+        <p:spPr>
+          <a:xfrm>
+            <a:off x="3525982" y="5791200"/>
+            <a:ext cx="4114800" cy="369332"/>
+          </a:xfrm>
+          <a:prstGeom prst="rect">
+            <a:avLst/>
+          </a:prstGeom>
+          <a:noFill/>
+        </p:spPr>
+        <p:txBody>
+          <a:bodyPr wrap="square" rtlCol="0">
+            <a:spAutoFit/>
+          </a:bodyPr>
+          <a:lstStyle/>
+          <a:p>
+            <a:r>
+              <a:rPr lang="en-US" dirty="0" smtClean="0">
+                <a:solidFill>
+                  <a:schemeClr val="accent1">
+                    <a:lumMod val="75000"/>
+                  </a:schemeClr>
+                </a:solidFill>
+              </a:rPr>
+              <a:t>Internal Guide :</a:t>
+            </a:r>
+            <a:r>
+              <a:rPr lang="en-US" dirty="0" smtClean="0"/>
+              <a:t> Prof. Nitin R. Patel</a:t>
+            </a:r>
+            <a:endParaRPr lang="en-US" dirty="0"/>
+          </a:p>
+        </p:txBody>
+      </p:sp>
     </p:spTree>
   </p:cSld>
   <p:clrMapOvr>
@@ -6251,40 +6387,68 @@
           <a:lstStyle/>
           <a:p>
             <a:r>
-              <a:rPr lang="en-US" b="1" dirty="0"/>
+              <a:rPr lang="en-US" sz="2400" b="1" dirty="0" smtClean="0"/>
               <a:t>Supportability</a:t>
             </a:r>
+            <a:endParaRPr lang="en-US" dirty="0" smtClean="0"/>
+          </a:p>
+          <a:p>
+            <a:r>
+              <a:rPr lang="en-US" sz="2000" dirty="0" smtClean="0"/>
+              <a:t>Our </a:t>
+            </a:r>
+            <a:r>
+              <a:rPr lang="en-US" sz="2000" dirty="0"/>
+              <a:t>app will be supportable in every android mobiles</a:t>
+            </a:r>
+            <a:r>
+              <a:rPr lang="en-US" sz="2000" dirty="0" smtClean="0"/>
+              <a:t>.</a:t>
+            </a:r>
+          </a:p>
+          <a:p>
+            <a:pPr marL="0" indent="0">
+              <a:buNone/>
+            </a:pPr>
+            <a:endParaRPr lang="en-US" b="1" dirty="0" smtClean="0"/>
+          </a:p>
+          <a:p>
+            <a:r>
+              <a:rPr lang="en-US" sz="2400" b="1" dirty="0" smtClean="0"/>
+              <a:t>Safety Requirement</a:t>
+            </a:r>
+            <a:endParaRPr lang="en-US" sz="2400" dirty="0" smtClean="0"/>
+          </a:p>
+          <a:p>
+            <a:r>
+              <a:rPr lang="en-US" sz="2000" dirty="0" smtClean="0"/>
+              <a:t>The </a:t>
+            </a:r>
+            <a:r>
+              <a:rPr lang="en-US" sz="2000" dirty="0"/>
+              <a:t>database may get crashed at any certain time due to viruses or operating system failures. Therefore, it is required to take the database backup</a:t>
+            </a:r>
+            <a:r>
+              <a:rPr lang="en-US" sz="2000" dirty="0" smtClean="0"/>
+              <a:t>.</a:t>
+            </a:r>
+          </a:p>
+          <a:p>
+            <a:pPr marL="0" indent="0">
+              <a:buNone/>
+            </a:pPr>
             <a:endParaRPr lang="en-US" dirty="0"/>
           </a:p>
           <a:p>
             <a:r>
-              <a:rPr lang="en-US" dirty="0"/>
-              <a:t>Our app will be supportable in every android mobiles.</a:t>
-            </a:r>
-          </a:p>
-          <a:p>
-            <a:r>
-              <a:rPr lang="en-US" b="1" dirty="0"/>
-              <a:t>Safety Requirement</a:t>
+              <a:rPr lang="en-US" sz="2400" b="1" dirty="0"/>
+              <a:t>Interface</a:t>
             </a:r>
             <a:endParaRPr lang="en-US" dirty="0"/>
           </a:p>
           <a:p>
             <a:r>
-              <a:rPr lang="en-US" dirty="0"/>
-              <a:t>The database may get crashed at any certain time due to viruses or operating system failures. Therefore, it is required to take the database backup.</a:t>
-            </a:r>
-          </a:p>
-          <a:p>
-            <a:r>
-              <a:rPr lang="en-US" b="1" dirty="0"/>
-              <a:t>Interface</a:t>
-            </a:r>
-            <a:endParaRPr lang="en-US" dirty="0"/>
-          </a:p>
-          <a:p>
-            <a:r>
-              <a:rPr lang="en-US" dirty="0"/>
+              <a:rPr lang="en-US" sz="2000" dirty="0"/>
               <a:t>Our application will accessible through any android mobile.</a:t>
             </a:r>
           </a:p>
@@ -6342,24 +6506,33 @@
         </p:spPr>
         <p:txBody>
           <a:bodyPr>
-            <a:normAutofit/>
+            <a:normAutofit lnSpcReduction="10000"/>
           </a:bodyPr>
           <a:lstStyle/>
           <a:p>
             <a:pPr>
-              <a:buNone/>
+              <a:buFont typeface="+mj-lt"/>
+              <a:buAutoNum type="arabicParenR" startAt="3"/>
             </a:pPr>
             <a:r>
+              <a:rPr lang="en-US" sz="2400" b="1" dirty="0" smtClean="0"/>
+              <a:t>HARDWARE </a:t>
+            </a:r>
+            <a:r>
+              <a:rPr lang="en-US" sz="2400" b="1" dirty="0"/>
+              <a:t>REQUIREMENTS</a:t>
+            </a:r>
+            <a:r>
               <a:rPr lang="en-US" b="1" dirty="0"/>
-              <a:t>3)HARDWARE REQUIREMENTS:</a:t>
-            </a:r>
-          </a:p>
-          <a:p>
-            <a:r>
-              <a:rPr lang="en-US" b="1" dirty="0"/>
+              <a:t>:</a:t>
+            </a:r>
+          </a:p>
+          <a:p>
+            <a:r>
+              <a:rPr lang="en-US" sz="2000" b="1" dirty="0"/>
               <a:t>Smart phone/tablet</a:t>
             </a:r>
-            <a:endParaRPr lang="en-US" dirty="0"/>
+            <a:endParaRPr lang="en-US" sz="2000" dirty="0"/>
           </a:p>
           <a:p>
             <a:pPr>
@@ -6381,7 +6554,7 @@
           </a:p>
           <a:p>
             <a:r>
-              <a:rPr lang="en-US" b="1" dirty="0"/>
+              <a:rPr lang="en-US" sz="2000" b="1" dirty="0"/>
               <a:t>Computer/laptop</a:t>
             </a:r>
           </a:p>
@@ -6404,46 +6577,55 @@
             </a:r>
           </a:p>
           <a:p>
-            <a:pPr>
-              <a:buNone/>
+            <a:pPr marL="514350" indent="-514350">
+              <a:buFont typeface="+mj-lt"/>
+              <a:buAutoNum type="arabicParenR" startAt="4"/>
             </a:pPr>
             <a:r>
+              <a:rPr lang="en-US" sz="2400" b="1" dirty="0" smtClean="0"/>
+              <a:t>SOFTWARE </a:t>
+            </a:r>
+            <a:r>
+              <a:rPr lang="en-US" sz="2400" b="1" dirty="0"/>
+              <a:t>REQUIREMENTS</a:t>
+            </a:r>
+            <a:r>
               <a:rPr lang="en-US" sz="3300" b="1" dirty="0"/>
-              <a:t>4) SOFTWARE REQUIREMENTS:</a:t>
+              <a:t>:</a:t>
             </a:r>
             <a:endParaRPr lang="en-US" sz="3800" b="1" dirty="0"/>
           </a:p>
           <a:p>
             <a:r>
-              <a:rPr lang="en-US" dirty="0"/>
+              <a:rPr lang="en-US" sz="2000" dirty="0"/>
               <a:t>Android Studio 3.0.1</a:t>
             </a:r>
           </a:p>
           <a:p>
             <a:r>
-              <a:rPr lang="en-US" dirty="0" err="1"/>
+              <a:rPr lang="en-US" sz="2000" dirty="0" err="1"/>
               <a:t>MySQL</a:t>
             </a:r>
             <a:r>
-              <a:rPr lang="en-US" dirty="0"/>
+              <a:rPr lang="en-US" sz="2000" dirty="0"/>
               <a:t> 5.6.12</a:t>
             </a:r>
           </a:p>
           <a:p>
             <a:r>
-              <a:rPr lang="en-US" dirty="0"/>
+              <a:rPr lang="en-US" sz="2000" dirty="0"/>
               <a:t>PHP 5.4.16</a:t>
             </a:r>
           </a:p>
           <a:p>
             <a:r>
-              <a:rPr lang="en-US" dirty="0"/>
+              <a:rPr lang="en-US" sz="2000" dirty="0"/>
               <a:t>Sublime Text</a:t>
             </a:r>
           </a:p>
           <a:p>
             <a:r>
-              <a:rPr lang="en-US" dirty="0"/>
+              <a:rPr lang="en-US" sz="2000" dirty="0"/>
               <a:t>XAMPP Server</a:t>
             </a:r>
           </a:p>
@@ -6491,7 +6673,7 @@
           <p:cNvPr id="4" name="Title 1">
             <a:extLst>
               <a:ext uri="{FF2B5EF4-FFF2-40B4-BE49-F238E27FC236}">
-                <a16:creationId xmlns:a16="http://schemas.microsoft.com/office/drawing/2014/main" id="{0B51D2DF-360D-41BB-B1C4-EA3E985EC889}"/>
+                <a16:creationId xmlns:a16="http://schemas.microsoft.com/office/drawing/2014/main" xmlns="" id="{0B51D2DF-360D-41BB-B1C4-EA3E985EC889}"/>
               </a:ext>
             </a:extLst>
           </p:cNvPr>
@@ -6542,7 +6724,7 @@
           <p:cNvPr id="5" name="Rectangle 4">
             <a:extLst>
               <a:ext uri="{FF2B5EF4-FFF2-40B4-BE49-F238E27FC236}">
-                <a16:creationId xmlns:a16="http://schemas.microsoft.com/office/drawing/2014/main" id="{04A0972F-4A12-4D82-BCBF-3DBCA76A5C1E}"/>
+                <a16:creationId xmlns:a16="http://schemas.microsoft.com/office/drawing/2014/main" xmlns="" id="{04A0972F-4A12-4D82-BCBF-3DBCA76A5C1E}"/>
               </a:ext>
             </a:extLst>
           </p:cNvPr>
@@ -6552,7 +6734,7 @@
         <p:spPr>
           <a:xfrm>
             <a:off x="304800" y="2494508"/>
-            <a:ext cx="7467600" cy="1200329"/>
+            <a:ext cx="7467600" cy="1323439"/>
           </a:xfrm>
           <a:prstGeom prst="rect">
             <a:avLst/>
@@ -6569,7 +6751,7 @@
               <a:buChar char="•"/>
             </a:pPr>
             <a:r>
-              <a:rPr lang="en-US" dirty="0">
+              <a:rPr lang="en-US" sz="2000" dirty="0">
                 <a:solidFill>
                   <a:srgbClr val="222222"/>
                 </a:solidFill>
@@ -6620,66 +6802,47 @@
             <p:ph idx="1"/>
           </p:nvPr>
         </p:nvSpPr>
-        <p:spPr/>
+        <p:spPr>
+          <a:xfrm>
+            <a:off x="609600" y="762000"/>
+            <a:ext cx="6347714" cy="3880773"/>
+          </a:xfrm>
+        </p:spPr>
         <p:txBody>
           <a:bodyPr>
             <a:normAutofit/>
           </a:bodyPr>
           <a:lstStyle/>
           <a:p>
-            <a:pPr marL="114300" marR="0" indent="0" algn="l">
+            <a:pPr marL="457200" marR="0" algn="l">
               <a:spcBef>
                 <a:spcPts val="0"/>
               </a:spcBef>
               <a:spcAft>
                 <a:spcPts val="0"/>
               </a:spcAft>
-              <a:buNone/>
+              <a:buFont typeface="+mj-lt"/>
+              <a:buAutoNum type="arabicParenR"/>
             </a:pPr>
-            <a:endParaRPr lang="en-US" sz="1800" dirty="0">
-              <a:solidFill>
-                <a:srgbClr val="222222"/>
-              </a:solidFill>
-              <a:latin typeface="Times New Roman" panose="02020603050405020304" pitchFamily="18" charset="0"/>
-            </a:endParaRPr>
-          </a:p>
-          <a:p>
-            <a:pPr marL="114300" marR="0" indent="0" algn="l">
-              <a:spcBef>
-                <a:spcPts val="0"/>
-              </a:spcBef>
-              <a:spcAft>
-                <a:spcPts val="0"/>
-              </a:spcAft>
-              <a:buNone/>
-            </a:pPr>
-            <a:endParaRPr lang="en-US" sz="1800" b="0" i="0" dirty="0">
-              <a:solidFill>
-                <a:srgbClr val="222222"/>
-              </a:solidFill>
-              <a:effectLst/>
-              <a:latin typeface="Times New Roman" panose="02020603050405020304" pitchFamily="18" charset="0"/>
-            </a:endParaRPr>
-          </a:p>
-          <a:p>
-            <a:pPr marL="114300" marR="0" indent="0" algn="l">
-              <a:spcBef>
-                <a:spcPts val="0"/>
-              </a:spcBef>
-              <a:spcAft>
-                <a:spcPts val="0"/>
-              </a:spcAft>
-              <a:buNone/>
-            </a:pPr>
-            <a:r>
-              <a:rPr lang="en-US" b="0" i="0" dirty="0">
+            <a:r>
+              <a:rPr lang="en-US" sz="2400" b="1" i="0" dirty="0" smtClean="0">
                 <a:solidFill>
                   <a:srgbClr val="222222"/>
                 </a:solidFill>
                 <a:effectLst/>
                 <a:latin typeface="Calibri" panose="020F0502020204030204" pitchFamily="34" charset="0"/>
               </a:rPr>
-              <a:t>1)Technical Feasibility:</a:t>
+              <a:t>Technical </a:t>
+            </a:r>
+            <a:r>
+              <a:rPr lang="en-US" sz="2400" b="1" i="0" dirty="0">
+                <a:solidFill>
+                  <a:srgbClr val="222222"/>
+                </a:solidFill>
+                <a:effectLst/>
+                <a:latin typeface="Calibri" panose="020F0502020204030204" pitchFamily="34" charset="0"/>
+              </a:rPr>
+              <a:t>Feasibility:</a:t>
             </a:r>
           </a:p>
           <a:p>
@@ -6711,7 +6874,7 @@
               <a:buNone/>
             </a:pPr>
             <a:r>
-              <a:rPr lang="en-US" sz="1800" b="0" i="0" dirty="0">
+              <a:rPr lang="en-US" sz="2000" b="0" i="0" dirty="0">
                 <a:solidFill>
                   <a:srgbClr val="222222"/>
                 </a:solidFill>
@@ -6721,7 +6884,7 @@
               <a:t>The </a:t>
             </a:r>
             <a:r>
-              <a:rPr lang="en-US" sz="1800" b="1" i="0" dirty="0">
+              <a:rPr lang="en-US" sz="2000" b="1" i="0" dirty="0">
                 <a:solidFill>
                   <a:srgbClr val="222222"/>
                 </a:solidFill>
@@ -6731,7 +6894,7 @@
               <a:t>technical feasibility </a:t>
             </a:r>
             <a:r>
-              <a:rPr lang="en-US" sz="1800" b="0" i="0" dirty="0">
+              <a:rPr lang="en-US" sz="2000" b="0" i="0" dirty="0">
                 <a:solidFill>
                   <a:srgbClr val="222222"/>
                 </a:solidFill>
@@ -6740,7 +6903,7 @@
               </a:rPr>
               <a:t>is worked for the project is done with the present equipment, manual procedures, existing   software technology and available technical hardware. This assessment focuses on the technical resources available to the organization. Technical feasibility also involves the evolution of the hardware, software, and other the technical requirements of the proposed system.</a:t>
             </a:r>
-            <a:endParaRPr lang="en-US" sz="1800" b="0" i="0" dirty="0">
+            <a:endParaRPr lang="en-US" sz="2000" b="0" i="0" dirty="0">
               <a:solidFill>
                 <a:srgbClr val="222222"/>
               </a:solidFill>
@@ -7108,7 +7271,7 @@
           <p:cNvPr id="3" name="Content Placeholder 2">
             <a:extLst>
               <a:ext uri="{FF2B5EF4-FFF2-40B4-BE49-F238E27FC236}">
-                <a16:creationId xmlns:a16="http://schemas.microsoft.com/office/drawing/2014/main" id="{482BE55A-1B7E-4D2F-9C9D-170D9427A31C}"/>
+                <a16:creationId xmlns:a16="http://schemas.microsoft.com/office/drawing/2014/main" xmlns="" id="{482BE55A-1B7E-4D2F-9C9D-170D9427A31C}"/>
               </a:ext>
             </a:extLst>
           </p:cNvPr>
@@ -7121,15 +7284,64 @@
         </p:nvSpPr>
         <p:spPr>
           <a:xfrm>
-            <a:off x="29852" y="228600"/>
-            <a:ext cx="8610600" cy="6049963"/>
+            <a:off x="0" y="1219200"/>
+            <a:ext cx="8047348" cy="3733800"/>
           </a:xfrm>
         </p:spPr>
         <p:txBody>
           <a:bodyPr>
-            <a:normAutofit lnSpcReduction="10000"/>
+            <a:normAutofit/>
           </a:bodyPr>
           <a:lstStyle/>
+          <a:p>
+            <a:pPr marL="628650" marR="0" indent="-514350" algn="l">
+              <a:spcBef>
+                <a:spcPts val="0"/>
+              </a:spcBef>
+              <a:spcAft>
+                <a:spcPts val="0"/>
+              </a:spcAft>
+              <a:buFont typeface="+mj-lt"/>
+              <a:buAutoNum type="arabicParenR" startAt="3"/>
+            </a:pPr>
+            <a:r>
+              <a:rPr lang="en-US" sz="2400" b="1" i="0" dirty="0" smtClean="0">
+                <a:solidFill>
+                  <a:srgbClr val="222222"/>
+                </a:solidFill>
+                <a:effectLst/>
+                <a:latin typeface="Times New Roman" panose="02020603050405020304" pitchFamily="18" charset="0"/>
+              </a:rPr>
+              <a:t>Economic </a:t>
+            </a:r>
+            <a:r>
+              <a:rPr lang="en-US" sz="2400" b="1" i="0" dirty="0">
+                <a:solidFill>
+                  <a:srgbClr val="222222"/>
+                </a:solidFill>
+                <a:effectLst/>
+                <a:latin typeface="Times New Roman" panose="02020603050405020304" pitchFamily="18" charset="0"/>
+              </a:rPr>
+              <a:t>feasibility</a:t>
+            </a:r>
+            <a:r>
+              <a:rPr lang="en-US" sz="2400" b="0" i="0" dirty="0">
+                <a:solidFill>
+                  <a:srgbClr val="222222"/>
+                </a:solidFill>
+                <a:effectLst/>
+                <a:latin typeface="Times New Roman" panose="02020603050405020304" pitchFamily="18" charset="0"/>
+              </a:rPr>
+              <a:t> </a:t>
+            </a:r>
+            <a:endParaRPr lang="en-US" sz="2400" b="0" i="0" dirty="0" smtClean="0">
+              <a:solidFill>
+                <a:srgbClr val="222222"/>
+              </a:solidFill>
+              <a:effectLst/>
+              <a:latin typeface="Times New Roman" panose="02020603050405020304" pitchFamily="18" charset="0"/>
+            </a:endParaRPr>
+          </a:p>
           <a:p>
             <a:pPr marL="114300" marR="0" indent="0" algn="l">
               <a:spcBef>
@@ -7140,37 +7352,7 @@
               </a:spcAft>
               <a:buNone/>
             </a:pPr>
-            <a:r>
-              <a:rPr lang="en-US" sz="3200" b="0" i="0" dirty="0">
-                <a:solidFill>
-                  <a:srgbClr val="222222"/>
-                </a:solidFill>
-                <a:effectLst/>
-                <a:latin typeface="Times New Roman" panose="02020603050405020304" pitchFamily="18" charset="0"/>
-              </a:rPr>
-              <a:t>  3) </a:t>
-            </a:r>
-            <a:r>
-              <a:rPr lang="en-US" sz="3200" b="1" i="0" dirty="0">
-                <a:solidFill>
-                  <a:srgbClr val="222222"/>
-                </a:solidFill>
-                <a:effectLst/>
-                <a:latin typeface="Times New Roman" panose="02020603050405020304" pitchFamily="18" charset="0"/>
-              </a:rPr>
-              <a:t>Economic feasibility</a:t>
-            </a:r>
-            <a:r>
-              <a:rPr lang="en-US" sz="3200" b="0" i="0" dirty="0">
-                <a:solidFill>
-                  <a:srgbClr val="222222"/>
-                </a:solidFill>
-                <a:effectLst/>
-                <a:latin typeface="Times New Roman" panose="02020603050405020304" pitchFamily="18" charset="0"/>
-              </a:rPr>
-              <a:t> </a:t>
-            </a:r>
-            <a:endParaRPr lang="en-US" sz="3200" b="0" i="0" dirty="0">
+            <a:endParaRPr lang="en-US" sz="2000" b="0" i="0" dirty="0">
               <a:solidFill>
                 <a:srgbClr val="222222"/>
               </a:solidFill>
@@ -7188,7 +7370,7 @@
               </a:spcAft>
             </a:pPr>
             <a:r>
-              <a:rPr lang="en-US" sz="3200" b="0" i="0" dirty="0">
+              <a:rPr lang="en-US" sz="2000" b="0" i="0" dirty="0">
                 <a:solidFill>
                   <a:srgbClr val="222222"/>
                 </a:solidFill>
@@ -7197,7 +7379,7 @@
               </a:rPr>
               <a:t>This assessment typically involves a cost/benefits analysis of the project, helping the organization determine the viability, cost, and benefits associated with a project before financial resources are allocated. The proposed system economically feasible as it removes manual work, reduces the manual mistake, decreases the number of people working. Economic feasibility is the system where the users have economic to this system the agency has to provide the required software.</a:t>
             </a:r>
-            <a:endParaRPr lang="en-US" sz="3200" b="0" i="0" dirty="0">
+            <a:endParaRPr lang="en-US" sz="2000" b="0" i="0" dirty="0">
               <a:solidFill>
                 <a:srgbClr val="222222"/>
               </a:solidFill>
@@ -7329,10 +7511,15 @@
             <p:ph idx="1"/>
           </p:nvPr>
         </p:nvSpPr>
-        <p:spPr/>
+        <p:spPr>
+          <a:xfrm>
+            <a:off x="609599" y="1676400"/>
+            <a:ext cx="6347714" cy="4364963"/>
+          </a:xfrm>
+        </p:spPr>
         <p:txBody>
           <a:bodyPr>
-            <a:normAutofit fontScale="85000" lnSpcReduction="20000"/>
+            <a:normAutofit fontScale="85000" lnSpcReduction="10000"/>
           </a:bodyPr>
           <a:lstStyle/>
           <a:p>
@@ -7349,7 +7536,7 @@
               </a:rPr>
               <a:t>Why we chose Spiral Model?</a:t>
             </a:r>
-            <a:endParaRPr lang="en-US" sz="4000" b="0" i="0" dirty="0">
+            <a:endParaRPr lang="en-US" sz="2400" b="0" i="0" dirty="0">
               <a:solidFill>
                 <a:srgbClr val="222222"/>
               </a:solidFill>
@@ -7533,7 +7720,7 @@
               </a:rPr>
               <a:t>  Reviewing the previous phase can correct the errors and take care of the new requirement.</a:t>
             </a:r>
-            <a:endParaRPr lang="en-US" sz="4000" b="0" i="0" dirty="0">
+            <a:endParaRPr lang="en-US" sz="2400" b="0" i="0" dirty="0">
               <a:solidFill>
                 <a:srgbClr val="222222"/>
               </a:solidFill>
@@ -7617,21 +7804,21 @@
               <a:buNone/>
             </a:pPr>
             <a:r>
-              <a:rPr lang="en-US" dirty="0"/>
+              <a:rPr lang="en-US" sz="2400" dirty="0"/>
               <a:t>1) How do we find our definition on project?</a:t>
             </a:r>
           </a:p>
           <a:p>
             <a:pPr lvl="1"/>
             <a:r>
-              <a:rPr lang="en-US" dirty="0"/>
+              <a:rPr lang="en-US" sz="2000" dirty="0"/>
               <a:t>By discussing amongst ourselves and with friends and relatives , we get to know the real time problem faced by people regarding the restaurant long waiting especially on occasions and functions. </a:t>
             </a:r>
           </a:p>
           <a:p>
             <a:pPr lvl="1"/>
             <a:r>
-              <a:rPr lang="en-US" dirty="0">
+              <a:rPr lang="en-US" sz="2000" dirty="0">
                 <a:solidFill>
                   <a:srgbClr val="FF0000"/>
                 </a:solidFill>
@@ -7711,31 +7898,31 @@
           <a:lstStyle/>
           <a:p>
             <a:r>
-              <a:rPr lang="en-US" dirty="0"/>
+              <a:rPr lang="en-US" sz="2000" dirty="0"/>
               <a:t>We are going to use “SPIRAL MODEL”.</a:t>
             </a:r>
           </a:p>
           <a:p>
             <a:r>
-              <a:rPr lang="en-US" b="1" dirty="0"/>
+              <a:rPr lang="en-US" sz="2000" b="1" dirty="0"/>
               <a:t>Spiral model</a:t>
             </a:r>
             <a:r>
-              <a:rPr lang="en-US" dirty="0"/>
+              <a:rPr lang="en-US" sz="2000" dirty="0"/>
               <a:t> is one of the most important Software Development Life Cycle models, which provides support for </a:t>
             </a:r>
             <a:r>
-              <a:rPr lang="en-US" b="1" dirty="0"/>
+              <a:rPr lang="en-US" sz="2000" b="1" dirty="0"/>
               <a:t>Risk Handling</a:t>
             </a:r>
             <a:r>
-              <a:rPr lang="en-US" dirty="0"/>
+              <a:rPr lang="en-US" sz="2000" dirty="0"/>
               <a:t>.</a:t>
             </a:r>
           </a:p>
           <a:p>
             <a:r>
-              <a:rPr lang="en-US" b="1" dirty="0"/>
+              <a:rPr lang="en-US" sz="2000" b="1" dirty="0"/>
               <a:t>Advantages of the Spiral Model </a:t>
             </a:r>
           </a:p>
@@ -7744,11 +7931,11 @@
               <a:buNone/>
             </a:pPr>
             <a:r>
-              <a:rPr lang="en-US" b="1" dirty="0"/>
+              <a:rPr lang="en-US" sz="2000" b="1" dirty="0"/>
               <a:t>	</a:t>
             </a:r>
             <a:r>
-              <a:rPr lang="en-US" dirty="0"/>
+              <a:rPr lang="en-US" sz="2000" dirty="0"/>
               <a:t>Best for a high-risk project </a:t>
             </a:r>
           </a:p>
@@ -7757,7 +7944,7 @@
               <a:buNone/>
             </a:pPr>
             <a:r>
-              <a:rPr lang="en-US" dirty="0"/>
+              <a:rPr lang="en-US" sz="2000" dirty="0"/>
               <a:t>	Good for large and mission-critical projects </a:t>
             </a:r>
           </a:p>
@@ -7766,7 +7953,7 @@
               <a:buNone/>
             </a:pPr>
             <a:r>
-              <a:rPr lang="en-US" dirty="0"/>
+              <a:rPr lang="en-US" sz="2000" dirty="0"/>
               <a:t>	Strong approval and documentation control </a:t>
             </a:r>
           </a:p>
@@ -7775,7 +7962,7 @@
               <a:buNone/>
             </a:pPr>
             <a:r>
-              <a:rPr lang="en-US" dirty="0"/>
+              <a:rPr lang="en-US" sz="2000" dirty="0"/>
               <a:t>	Continuous or repeated development helps in risk management Development is fast and features are added in a systematic approach</a:t>
             </a:r>
           </a:p>
@@ -7784,7 +7971,7 @@
               <a:buNone/>
             </a:pPr>
             <a:r>
-              <a:rPr lang="en-US" dirty="0"/>
+              <a:rPr lang="en-US" sz="2000" dirty="0"/>
               <a:t>	Additional functionality or change can be done at a later stage. </a:t>
             </a:r>
           </a:p>
@@ -7793,7 +7980,7 @@
               <a:buNone/>
             </a:pPr>
             <a:r>
-              <a:rPr lang="en-US" dirty="0"/>
+              <a:rPr lang="en-US" sz="2000" dirty="0"/>
               <a:t>	Cost estimation becomes easy as the prototype building happens in small fragments. There is always space for Customer feedback.</a:t>
             </a:r>
           </a:p>
@@ -7907,7 +8094,7 @@
           <p:cNvPr id="5" name="Content Placeholder 4">
             <a:extLst>
               <a:ext uri="{FF2B5EF4-FFF2-40B4-BE49-F238E27FC236}">
-                <a16:creationId xmlns:a16="http://schemas.microsoft.com/office/drawing/2014/main" id="{56ADB524-2A14-449A-94E5-C4D2FCFBE6E9}"/>
+                <a16:creationId xmlns:a16="http://schemas.microsoft.com/office/drawing/2014/main" xmlns="" id="{56ADB524-2A14-449A-94E5-C4D2FCFBE6E9}"/>
               </a:ext>
             </a:extLst>
           </p:cNvPr>
@@ -7932,8 +8119,8 @@
         </p:blipFill>
         <p:spPr>
           <a:xfrm>
-            <a:off x="2295061" y="2160588"/>
-            <a:ext cx="2977490" cy="3881437"/>
+            <a:off x="1143000" y="635941"/>
+            <a:ext cx="6324600" cy="5841059"/>
           </a:xfrm>
         </p:spPr>
       </p:pic>
@@ -8007,7 +8194,7 @@
           <a:lstStyle/>
           <a:p>
             <a:r>
-              <a:rPr lang="en-US" dirty="0"/>
+              <a:rPr lang="en-US" sz="2400" dirty="0"/>
               <a:t>We have made variety of diagrams based on our project and they are :</a:t>
             </a:r>
           </a:p>
@@ -8017,7 +8204,7 @@
               <a:buAutoNum type="arabicPeriod"/>
             </a:pPr>
             <a:r>
-              <a:rPr lang="en-US" dirty="0"/>
+              <a:rPr lang="en-US" sz="2000" dirty="0"/>
               <a:t>Use Case diagrams</a:t>
             </a:r>
           </a:p>
@@ -8027,7 +8214,7 @@
               <a:buAutoNum type="arabicPeriod"/>
             </a:pPr>
             <a:r>
-              <a:rPr lang="en-US" dirty="0"/>
+              <a:rPr lang="en-US" sz="2000" dirty="0"/>
               <a:t>Activity Diagrams</a:t>
             </a:r>
           </a:p>
@@ -8037,7 +8224,7 @@
               <a:buAutoNum type="arabicPeriod"/>
             </a:pPr>
             <a:r>
-              <a:rPr lang="en-US" dirty="0"/>
+              <a:rPr lang="en-US" sz="2000" dirty="0"/>
               <a:t>E-R Diagram </a:t>
             </a:r>
           </a:p>
@@ -8047,7 +8234,7 @@
               <a:buAutoNum type="arabicPeriod"/>
             </a:pPr>
             <a:r>
-              <a:rPr lang="en-US" dirty="0"/>
+              <a:rPr lang="en-US" sz="2000" dirty="0"/>
               <a:t>Sequence Diagrams</a:t>
             </a:r>
           </a:p>
@@ -8057,7 +8244,7 @@
               <a:buAutoNum type="arabicPeriod"/>
             </a:pPr>
             <a:r>
-              <a:rPr lang="en-US" dirty="0"/>
+              <a:rPr lang="en-US" sz="2000" dirty="0"/>
               <a:t>Class Diagram</a:t>
             </a:r>
           </a:p>
@@ -8104,7 +8291,7 @@
           <p:cNvPr id="2" name="Title 1">
             <a:extLst>
               <a:ext uri="{FF2B5EF4-FFF2-40B4-BE49-F238E27FC236}">
-                <a16:creationId xmlns:a16="http://schemas.microsoft.com/office/drawing/2014/main" id="{1965469C-7555-4F99-B773-AF83797C1A7E}"/>
+                <a16:creationId xmlns:a16="http://schemas.microsoft.com/office/drawing/2014/main" xmlns="" id="{1965469C-7555-4F99-B773-AF83797C1A7E}"/>
               </a:ext>
             </a:extLst>
           </p:cNvPr>
@@ -8244,7 +8431,7 @@
           <a:graphicData uri="http://schemas.openxmlformats.org/presentationml/2006/ole">
             <mc:AlternateContent xmlns:mc="http://schemas.openxmlformats.org/markup-compatibility/2006">
               <mc:Choice xmlns:v="urn:schemas-microsoft-com:vml" Requires="v">
-                <p:oleObj spid="_x0000_s2080" name="Visio" r:id="rId3" imgW="6486663" imgH="7257885" progId="Visio.Drawing.15">
+                <p:oleObj spid="_x0000_s2101" name="Visio" r:id="rId3" imgW="6486663" imgH="7257885" progId="Visio.Drawing.15">
                   <p:embed/>
                 </p:oleObj>
               </mc:Choice>
@@ -8561,8 +8748,8 @@
         </p:nvSpPr>
         <p:spPr>
           <a:xfrm>
-            <a:off x="457200" y="457200"/>
-            <a:ext cx="8229600" cy="7315200"/>
+            <a:off x="381000" y="990600"/>
+            <a:ext cx="8229600" cy="6172200"/>
           </a:xfrm>
         </p:spPr>
         <p:txBody>
@@ -8575,50 +8762,59 @@
               <a:buNone/>
             </a:pPr>
             <a:r>
+              <a:rPr lang="en-US" sz="2400" dirty="0"/>
+              <a:t>2) To whom we contacted for project definition?</a:t>
+            </a:r>
+          </a:p>
+          <a:p>
+            <a:pPr lvl="1">
+              <a:buNone/>
+            </a:pPr>
+            <a:r>
+              <a:rPr lang="en-US" sz="2000" dirty="0"/>
+              <a:t>-&gt;We talked with few Restaurant Managers of different restaurants and we opted the project by knowing the problems faced by their customers and their staff as well and we will try to resolve them all</a:t>
+            </a:r>
+            <a:r>
+              <a:rPr lang="en-US" sz="2000" dirty="0" smtClean="0"/>
+              <a:t>.</a:t>
+            </a:r>
+          </a:p>
+          <a:p>
+            <a:pPr lvl="1">
+              <a:buNone/>
+            </a:pPr>
+            <a:endParaRPr lang="en-US" sz="2400" dirty="0"/>
+          </a:p>
+          <a:p>
+            <a:pPr>
+              <a:buNone/>
+            </a:pPr>
+            <a:r>
+              <a:rPr lang="en-US" sz="2400" dirty="0"/>
+              <a:t>3) What are the data or information we collected ?</a:t>
+            </a:r>
+          </a:p>
+          <a:p>
+            <a:pPr>
+              <a:buNone/>
+            </a:pPr>
+            <a:r>
               <a:rPr lang="en-US" dirty="0"/>
-              <a:t>2) To whom we contacted for project definition?</a:t>
-            </a:r>
-          </a:p>
-          <a:p>
-            <a:pPr lvl="1">
+              <a:t>	</a:t>
+            </a:r>
+            <a:r>
+              <a:rPr lang="en-US" sz="2000" dirty="0"/>
+              <a:t>-&gt; Both the customers and restaurants told us about the issues of waiting queue for table reservation and managing the queue respectively. </a:t>
+            </a:r>
+          </a:p>
+          <a:p>
+            <a:pPr>
               <a:buNone/>
             </a:pPr>
             <a:r>
-              <a:rPr lang="en-US" dirty="0"/>
-              <a:t>-&gt;We talked with few Restaurant Managers of different restaurants and we opted the project by knowing the problems faced by their customers and their staff as well and we will try to resolve them all.</a:t>
-            </a:r>
-          </a:p>
-          <a:p>
-            <a:pPr>
-              <a:buNone/>
-            </a:pPr>
-            <a:r>
-              <a:rPr lang="en-US" dirty="0"/>
-              <a:t>3) What are the data or information we collected ?</a:t>
-            </a:r>
-          </a:p>
-          <a:p>
-            <a:pPr>
-              <a:buNone/>
-            </a:pPr>
-            <a:r>
-              <a:rPr lang="en-US" dirty="0"/>
-              <a:t>	-&gt; </a:t>
-            </a:r>
-            <a:r>
-              <a:rPr lang="en-US" sz="2800" dirty="0"/>
-              <a:t>Both the customers and restaurants told us about the issues of waiting queue for table reservation and managing the queue respectively. </a:t>
-            </a:r>
-          </a:p>
-          <a:p>
-            <a:pPr>
-              <a:buNone/>
-            </a:pPr>
-            <a:r>
-              <a:rPr lang="en-US" sz="2800" dirty="0"/>
+              <a:rPr lang="en-US" sz="2000" dirty="0"/>
               <a:t>	-&gt; Due  to long waiting, social distancing is not being followed so customers avoid going much in restaurants and so the restaurants are also at loss.</a:t>
             </a:r>
-            <a:endParaRPr lang="en-US" dirty="0"/>
           </a:p>
           <a:p>
             <a:pPr>
@@ -9317,8 +9513,8 @@
         </p:nvSpPr>
         <p:spPr>
           <a:xfrm>
-            <a:off x="457200" y="381000"/>
-            <a:ext cx="8229600" cy="6096000"/>
+            <a:off x="381000" y="990600"/>
+            <a:ext cx="8229600" cy="3505200"/>
           </a:xfrm>
         </p:spPr>
         <p:txBody>
@@ -9331,8 +9527,21 @@
               <a:buNone/>
             </a:pPr>
             <a:r>
+              <a:rPr lang="en-US" sz="2400" dirty="0"/>
+              <a:t>4) What are the problems people(customers) are facing?</a:t>
+            </a:r>
+          </a:p>
+          <a:p>
+            <a:pPr>
+              <a:buNone/>
+            </a:pPr>
+            <a:r>
               <a:rPr lang="en-US" dirty="0"/>
-              <a:t>4) What are the problems people(customers) are facing?</a:t>
+              <a:t>	</a:t>
+            </a:r>
+            <a:r>
+              <a:rPr lang="en-US" sz="2000" dirty="0"/>
+              <a:t>-&gt;As there is increasing demand for restaurant food but there is a big queue and customers have to wait for table to be vacant and even after acquiring the table they have to wait for the  food to be served at their table so this results into their time waste.</a:t>
             </a:r>
           </a:p>
           <a:p>
@@ -9340,16 +9549,7 @@
               <a:buNone/>
             </a:pPr>
             <a:r>
-              <a:rPr lang="en-US" dirty="0"/>
-              <a:t>	-&gt;As there is increasing demand for restaurant food but there is a big queue and customers have to wait for table to be vacant and even after acquiring the table they have to wait for the  food to be served at their table so this results into their time waste.</a:t>
-            </a:r>
-          </a:p>
-          <a:p>
-            <a:pPr>
-              <a:buNone/>
-            </a:pPr>
-            <a:r>
-              <a:rPr lang="en-US" dirty="0"/>
+              <a:rPr lang="en-US" sz="2000" dirty="0"/>
               <a:t>	-&gt;As far as the current situation of COVID-19 is concerned , people are not able to follow “social distancing” due to rush at restaurants. So it is also a big problem nowadays for both customers and restaurants.</a:t>
             </a:r>
           </a:p>
@@ -9597,7 +9797,7 @@
           <p:cNvPr id="2" name="Title 1">
             <a:extLst>
               <a:ext uri="{FF2B5EF4-FFF2-40B4-BE49-F238E27FC236}">
-                <a16:creationId xmlns:a16="http://schemas.microsoft.com/office/drawing/2014/main" id="{9CAF2976-4B61-49FD-8BEB-5AE803ABF041}"/>
+                <a16:creationId xmlns:a16="http://schemas.microsoft.com/office/drawing/2014/main" xmlns="" id="{9CAF2976-4B61-49FD-8BEB-5AE803ABF041}"/>
               </a:ext>
             </a:extLst>
           </p:cNvPr>
@@ -9618,6 +9818,7 @@
           <a:bodyPr/>
           <a:lstStyle/>
           <a:p>
+            <a:pPr algn="ctr"/>
             <a:r>
               <a:rPr lang="en-IN" dirty="0"/>
               <a:t>Thank You</a:t>
@@ -9667,8 +9868,8 @@
         </p:nvSpPr>
         <p:spPr>
           <a:xfrm>
-            <a:off x="457200" y="762000"/>
-            <a:ext cx="8229600" cy="5364163"/>
+            <a:off x="457200" y="1371600"/>
+            <a:ext cx="8229600" cy="2819400"/>
           </a:xfrm>
         </p:spPr>
         <p:txBody>
@@ -9681,7 +9882,7 @@
               <a:buNone/>
             </a:pPr>
             <a:r>
-              <a:rPr lang="en-US" dirty="0"/>
+              <a:rPr lang="en-US" sz="2400" dirty="0"/>
               <a:t>5) What are the solutions be provided by our project to overcome the problems faced by people?</a:t>
             </a:r>
           </a:p>
@@ -9690,12 +9891,25 @@
               <a:buNone/>
             </a:pPr>
             <a:r>
-              <a:rPr lang="en-US" dirty="0"/>
+              <a:rPr lang="en-US" b="1" dirty="0"/>
               <a:t>	</a:t>
             </a:r>
             <a:r>
+              <a:rPr lang="en-US" sz="2800" b="1" dirty="0"/>
+              <a:t>(Main motto: TIME SAVING)</a:t>
+            </a:r>
+          </a:p>
+          <a:p>
+            <a:pPr>
+              <a:buNone/>
+            </a:pPr>
+            <a:r>
               <a:rPr lang="en-US" sz="2800" dirty="0"/>
-              <a:t>(Main motto: TIME SAVING)</a:t>
+              <a:t>	</a:t>
+            </a:r>
+            <a:r>
+              <a:rPr lang="en-US" sz="2000" dirty="0"/>
+              <a:t>-&gt;Advance Restaurant and Table Booking</a:t>
             </a:r>
           </a:p>
           <a:p>
@@ -9703,16 +9917,7 @@
               <a:buNone/>
             </a:pPr>
             <a:r>
-              <a:rPr lang="en-US" sz="2800" dirty="0"/>
-              <a:t>	-&gt;Advance Restaurant and Table Booking</a:t>
-            </a:r>
-          </a:p>
-          <a:p>
-            <a:pPr>
-              <a:buNone/>
-            </a:pPr>
-            <a:r>
-              <a:rPr lang="en-US" sz="2800" dirty="0"/>
+              <a:rPr lang="en-US" sz="2000" dirty="0"/>
               <a:t>	-&gt;Prior Menu Ordering</a:t>
             </a:r>
           </a:p>
@@ -9783,13 +9988,13 @@
           <a:lstStyle/>
           <a:p>
             <a:r>
-              <a:rPr lang="en-US" dirty="0"/>
+              <a:rPr lang="en-US" sz="2000" dirty="0"/>
               <a:t>Our app will give the users the easiness of booking table according to their convenience, viewing menu ,order their food in advance from anywhere at any time and a Take Away facility too.</a:t>
             </a:r>
           </a:p>
           <a:p>
             <a:r>
-              <a:rPr lang="en-US" dirty="0"/>
+              <a:rPr lang="en-US" sz="2000" dirty="0"/>
               <a:t>Our goal is to save our customers’ time and also to maintain social distancing by not having rush of people at restaurant . We will also display the top most pick items in the restaurant being selected by the user.</a:t>
             </a:r>
           </a:p>
@@ -9855,33 +10060,38 @@
             <p:ph idx="1"/>
           </p:nvPr>
         </p:nvSpPr>
-        <p:spPr/>
+        <p:spPr>
+          <a:xfrm>
+            <a:off x="609598" y="1295400"/>
+            <a:ext cx="7543801" cy="5257800"/>
+          </a:xfrm>
+        </p:spPr>
         <p:txBody>
           <a:bodyPr>
-            <a:normAutofit fontScale="85000" lnSpcReduction="20000"/>
+            <a:normAutofit fontScale="92500" lnSpcReduction="10000"/>
           </a:bodyPr>
           <a:lstStyle/>
           <a:p>
             <a:r>
-              <a:rPr lang="en-US" dirty="0"/>
+              <a:rPr lang="en-US" sz="2200" dirty="0"/>
               <a:t>As nowadays demand for restaurant food is increasing. The youngsters and elders love to go to restaurants and enjoy the food .But as we know that there is a long waiting (especially during special occasions) to acquire a table in restaurant and having the food at our table. </a:t>
             </a:r>
           </a:p>
           <a:p>
             <a:r>
-              <a:rPr lang="en-US" dirty="0"/>
+              <a:rPr lang="en-US" sz="2200" dirty="0"/>
               <a:t>So, here our aim is to resolve these problems through our system or application by booking a table in any restaurant from anywhere and can also order their meal in advance. (Main motto: TIME SAVING). Also an alert message facility is provided if vacant table available before booked timings. </a:t>
             </a:r>
           </a:p>
           <a:p>
             <a:r>
-              <a:rPr lang="en-US" dirty="0"/>
+              <a:rPr lang="en-US" sz="2200" dirty="0"/>
               <a:t>We will use ML concepts for recommendation of top picks through the analysis of customer’s liking history. We will also provide the view of tables so people can book tables according to their likings and privacy.</a:t>
             </a:r>
           </a:p>
           <a:p>
             <a:r>
-              <a:rPr lang="en-US" dirty="0"/>
+              <a:rPr lang="en-US" sz="2200" dirty="0"/>
               <a:t> Our product is very beneficial in this COVID-19 pandemic as there won’t be waiting and rush to acquire a table in restaurant and so social distancing is followed. </a:t>
             </a:r>
           </a:p>
@@ -9947,10 +10157,15 @@
             <p:ph idx="1"/>
           </p:nvPr>
         </p:nvSpPr>
-        <p:spPr/>
+        <p:spPr>
+          <a:xfrm>
+            <a:off x="609600" y="1676400"/>
+            <a:ext cx="7315201" cy="4593563"/>
+          </a:xfrm>
+        </p:spPr>
         <p:txBody>
           <a:bodyPr>
-            <a:normAutofit fontScale="62500" lnSpcReduction="20000"/>
+            <a:normAutofit fontScale="92500" lnSpcReduction="20000"/>
           </a:bodyPr>
           <a:lstStyle/>
           <a:p>
@@ -9958,43 +10173,43 @@
               <a:buAutoNum type="arabicParenR"/>
             </a:pPr>
             <a:r>
-              <a:rPr lang="en-US" b="1" dirty="0"/>
+              <a:rPr lang="en-US" sz="3800" b="1" dirty="0"/>
               <a:t>FUNCTIONAL REQUIREMENTS:</a:t>
             </a:r>
           </a:p>
           <a:p>
             <a:r>
-              <a:rPr lang="en-US" sz="2800" dirty="0"/>
+              <a:rPr lang="en-US" sz="2400" dirty="0"/>
               <a:t>Registration/Login and Profile: View Profile, Edit Profile , View Order History</a:t>
             </a:r>
           </a:p>
           <a:p>
             <a:r>
-              <a:rPr lang="en-US" sz="2800" dirty="0"/>
+              <a:rPr lang="en-US" sz="2400" dirty="0"/>
               <a:t>Table Booking and Menu Ordering: View Table Layout and book table according to their convenience . View menu and place order in advance </a:t>
             </a:r>
           </a:p>
           <a:p>
             <a:r>
-              <a:rPr lang="en-US" sz="2800" dirty="0"/>
+              <a:rPr lang="en-US" sz="2400" dirty="0"/>
               <a:t>Take away: Order status</a:t>
             </a:r>
           </a:p>
           <a:p>
             <a:r>
-              <a:rPr lang="en-US" sz="2800" dirty="0"/>
+              <a:rPr lang="en-US" sz="2400" dirty="0"/>
               <a:t>Payment</a:t>
             </a:r>
           </a:p>
           <a:p>
             <a:r>
-              <a:rPr lang="en-US" sz="2800" dirty="0"/>
+              <a:rPr lang="en-US" sz="2400" dirty="0"/>
               <a:t>Management System:  Admin will manage customers and restaurant account. Also provide help regarding our app working issues if needed.</a:t>
             </a:r>
           </a:p>
           <a:p>
             <a:r>
-              <a:rPr lang="en-US" sz="2800" dirty="0"/>
+              <a:rPr lang="en-US" sz="2400" dirty="0"/>
               <a:t>Reviews and Ratings</a:t>
             </a:r>
           </a:p>
@@ -10046,97 +10261,102 @@
         </p:spPr>
         <p:txBody>
           <a:bodyPr>
-            <a:normAutofit fontScale="85000" lnSpcReduction="20000"/>
+            <a:normAutofit fontScale="70000" lnSpcReduction="20000"/>
           </a:bodyPr>
           <a:lstStyle/>
           <a:p>
             <a:pPr>
-              <a:buNone/>
+              <a:buFont typeface="+mj-lt"/>
+              <a:buAutoNum type="arabicParenR" startAt="2"/>
             </a:pPr>
             <a:r>
-              <a:rPr lang="en-US" b="1" dirty="0"/>
-              <a:t>2) NON-FUNCTIONAL REQUIREMENTS:</a:t>
-            </a:r>
-          </a:p>
-          <a:p>
-            <a:r>
-              <a:rPr lang="en-US" sz="2400" b="1" dirty="0"/>
+              <a:rPr lang="en-US" sz="3100" b="1" dirty="0" smtClean="0"/>
+              <a:t>NON-FUNCTIONAL </a:t>
+            </a:r>
+            <a:r>
+              <a:rPr lang="en-US" sz="3100" b="1" dirty="0"/>
+              <a:t>REQUIREMENTS:</a:t>
+            </a:r>
+          </a:p>
+          <a:p>
+            <a:r>
+              <a:rPr lang="en-US" sz="2700" b="1" dirty="0"/>
               <a:t>Security</a:t>
             </a:r>
           </a:p>
           <a:p>
             <a:r>
-              <a:rPr lang="en-US" sz="2400" dirty="0"/>
+              <a:rPr lang="en-US" sz="2700" dirty="0"/>
               <a:t>Admin has highest authority to manage customers and restaurants.</a:t>
             </a:r>
           </a:p>
           <a:p>
             <a:r>
-              <a:rPr lang="en-US" sz="2400" dirty="0"/>
+              <a:rPr lang="en-US" sz="2700" dirty="0"/>
               <a:t>Restaurant  has the  authority for managing the orders.</a:t>
             </a:r>
           </a:p>
           <a:p>
             <a:r>
-              <a:rPr lang="en-US" sz="2400" dirty="0"/>
+              <a:rPr lang="en-US" sz="2700" dirty="0"/>
               <a:t>Users can view booked order detail and take a report of that.</a:t>
             </a:r>
           </a:p>
           <a:p>
             <a:r>
-              <a:rPr lang="en-US" sz="2400" dirty="0"/>
+              <a:rPr lang="en-US" sz="2700" dirty="0"/>
               <a:t>Passwords should be stored in encrypted form.</a:t>
             </a:r>
           </a:p>
           <a:p>
             <a:r>
-              <a:rPr lang="en-US" sz="2400" b="1" dirty="0"/>
+              <a:rPr lang="en-US" sz="2700" b="1" dirty="0"/>
               <a:t>Usability</a:t>
             </a:r>
-            <a:endParaRPr lang="en-US" sz="2400" dirty="0"/>
-          </a:p>
-          <a:p>
-            <a:r>
-              <a:rPr lang="en-US" sz="2400" dirty="0"/>
+            <a:endParaRPr lang="en-US" sz="2700" dirty="0"/>
+          </a:p>
+          <a:p>
+            <a:r>
+              <a:rPr lang="en-US" sz="2700" dirty="0"/>
               <a:t>The navigation in the app will be user-friendly  i.e. table layout , menus and each and every detail will be presented in a simple way.</a:t>
             </a:r>
           </a:p>
           <a:p>
             <a:r>
-              <a:rPr lang="en-US" sz="2400" b="1" dirty="0"/>
+              <a:rPr lang="en-US" sz="2700" b="1" dirty="0"/>
               <a:t>Reliability</a:t>
             </a:r>
-            <a:endParaRPr lang="en-US" sz="2400" dirty="0"/>
-          </a:p>
-          <a:p>
-            <a:r>
-              <a:rPr lang="en-US" sz="2400" dirty="0"/>
+            <a:endParaRPr lang="en-US" sz="2700" dirty="0"/>
+          </a:p>
+          <a:p>
+            <a:r>
+              <a:rPr lang="en-US" sz="2700" dirty="0"/>
               <a:t>Our app will be available for users but in some maintenance days, it will not be available. Data validation and verification need to be done whenever required at any stage of activity.</a:t>
             </a:r>
           </a:p>
           <a:p>
             <a:r>
-              <a:rPr lang="en-US" sz="2400" dirty="0"/>
+              <a:rPr lang="en-US" sz="2700" dirty="0"/>
               <a:t>Validating user input.</a:t>
             </a:r>
           </a:p>
           <a:p>
             <a:r>
-              <a:rPr lang="en-US" sz="2400" b="1" dirty="0"/>
+              <a:rPr lang="en-US" sz="2700" b="1" dirty="0"/>
               <a:t>Performance</a:t>
             </a:r>
-            <a:endParaRPr lang="en-US" sz="2400" dirty="0"/>
-          </a:p>
-          <a:p>
-            <a:r>
-              <a:rPr lang="en-US" sz="2400" dirty="0"/>
+            <a:endParaRPr lang="en-US" sz="2700" dirty="0"/>
+          </a:p>
+          <a:p>
+            <a:r>
+              <a:rPr lang="en-US" sz="2700" dirty="0"/>
               <a:t>Our app will not take longer than 10 seconds to respond to a request, when using 3G or 4G Internet connection.</a:t>
             </a:r>
             <a:r>
-              <a:rPr lang="en-US" sz="2400" b="1" dirty="0"/>
+              <a:rPr lang="en-US" sz="2700" b="1" dirty="0"/>
               <a:t> </a:t>
             </a:r>
-            <a:endParaRPr lang="en-US" sz="2400" dirty="0"/>
+            <a:endParaRPr lang="en-US" sz="2700" dirty="0"/>
           </a:p>
         </p:txBody>
       </p:sp>
@@ -10399,7 +10619,7 @@
   <a:extraClrSchemeLst/>
   <a:extLst>
     <a:ext uri="{05A4C25C-085E-4340-85A3-A5531E510DB2}">
-      <thm15:themeFamily xmlns:thm15="http://schemas.microsoft.com/office/thememl/2012/main" name="Facet" id="{C0C680CD-088A-49FC-A102-D699147F32B2}" vid="{23659B44-6E34-4CE8-8F0D-387DA7996826}"/>
+      <thm15:themeFamily xmlns:thm15="http://schemas.microsoft.com/office/thememl/2012/main" xmlns="" name="Facet" id="{C0C680CD-088A-49FC-A102-D699147F32B2}" vid="{23659B44-6E34-4CE8-8F0D-387DA7996826}"/>
     </a:ext>
   </a:extLst>
 </a:theme>

</xml_diff>